<commit_message>
Pushing All smiles Patient Payment UI
</commit_message>
<xml_diff>
--- a/React/Beginner/AllSmiles/UI Screens.pptx
+++ b/React/Beginner/AllSmiles/UI Screens.pptx
@@ -2193,7 +2193,7 @@
           <a:p>
             <a:fld id="{6CB52EF3-BD4F-4CDA-A68B-0053BCFE8C39}" type="datetimeFigureOut">
               <a:rPr lang="en-IN" smtClean="0"/>
-              <a:t>23-09-2024</a:t>
+              <a:t>06-10-2024</a:t>
             </a:fld>
             <a:endParaRPr lang="en-IN"/>
           </a:p>
@@ -2393,7 +2393,7 @@
           <a:p>
             <a:fld id="{6CB52EF3-BD4F-4CDA-A68B-0053BCFE8C39}" type="datetimeFigureOut">
               <a:rPr lang="en-IN" smtClean="0"/>
-              <a:t>23-09-2024</a:t>
+              <a:t>06-10-2024</a:t>
             </a:fld>
             <a:endParaRPr lang="en-IN"/>
           </a:p>
@@ -2603,7 +2603,7 @@
           <a:p>
             <a:fld id="{6CB52EF3-BD4F-4CDA-A68B-0053BCFE8C39}" type="datetimeFigureOut">
               <a:rPr lang="en-IN" smtClean="0"/>
-              <a:t>23-09-2024</a:t>
+              <a:t>06-10-2024</a:t>
             </a:fld>
             <a:endParaRPr lang="en-IN"/>
           </a:p>
@@ -2803,7 +2803,7 @@
           <a:p>
             <a:fld id="{6CB52EF3-BD4F-4CDA-A68B-0053BCFE8C39}" type="datetimeFigureOut">
               <a:rPr lang="en-IN" smtClean="0"/>
-              <a:t>23-09-2024</a:t>
+              <a:t>06-10-2024</a:t>
             </a:fld>
             <a:endParaRPr lang="en-IN"/>
           </a:p>
@@ -3079,7 +3079,7 @@
           <a:p>
             <a:fld id="{6CB52EF3-BD4F-4CDA-A68B-0053BCFE8C39}" type="datetimeFigureOut">
               <a:rPr lang="en-IN" smtClean="0"/>
-              <a:t>23-09-2024</a:t>
+              <a:t>06-10-2024</a:t>
             </a:fld>
             <a:endParaRPr lang="en-IN"/>
           </a:p>
@@ -3347,7 +3347,7 @@
           <a:p>
             <a:fld id="{6CB52EF3-BD4F-4CDA-A68B-0053BCFE8C39}" type="datetimeFigureOut">
               <a:rPr lang="en-IN" smtClean="0"/>
-              <a:t>23-09-2024</a:t>
+              <a:t>06-10-2024</a:t>
             </a:fld>
             <a:endParaRPr lang="en-IN"/>
           </a:p>
@@ -3762,7 +3762,7 @@
           <a:p>
             <a:fld id="{6CB52EF3-BD4F-4CDA-A68B-0053BCFE8C39}" type="datetimeFigureOut">
               <a:rPr lang="en-IN" smtClean="0"/>
-              <a:t>23-09-2024</a:t>
+              <a:t>06-10-2024</a:t>
             </a:fld>
             <a:endParaRPr lang="en-IN"/>
           </a:p>
@@ -3904,7 +3904,7 @@
           <a:p>
             <a:fld id="{6CB52EF3-BD4F-4CDA-A68B-0053BCFE8C39}" type="datetimeFigureOut">
               <a:rPr lang="en-IN" smtClean="0"/>
-              <a:t>23-09-2024</a:t>
+              <a:t>06-10-2024</a:t>
             </a:fld>
             <a:endParaRPr lang="en-IN"/>
           </a:p>
@@ -4017,7 +4017,7 @@
           <a:p>
             <a:fld id="{6CB52EF3-BD4F-4CDA-A68B-0053BCFE8C39}" type="datetimeFigureOut">
               <a:rPr lang="en-IN" smtClean="0"/>
-              <a:t>23-09-2024</a:t>
+              <a:t>06-10-2024</a:t>
             </a:fld>
             <a:endParaRPr lang="en-IN"/>
           </a:p>
@@ -4330,7 +4330,7 @@
           <a:p>
             <a:fld id="{6CB52EF3-BD4F-4CDA-A68B-0053BCFE8C39}" type="datetimeFigureOut">
               <a:rPr lang="en-IN" smtClean="0"/>
-              <a:t>23-09-2024</a:t>
+              <a:t>06-10-2024</a:t>
             </a:fld>
             <a:endParaRPr lang="en-IN"/>
           </a:p>
@@ -4619,7 +4619,7 @@
           <a:p>
             <a:fld id="{6CB52EF3-BD4F-4CDA-A68B-0053BCFE8C39}" type="datetimeFigureOut">
               <a:rPr lang="en-IN" smtClean="0"/>
-              <a:t>23-09-2024</a:t>
+              <a:t>06-10-2024</a:t>
             </a:fld>
             <a:endParaRPr lang="en-IN"/>
           </a:p>
@@ -4862,7 +4862,7 @@
           <a:p>
             <a:fld id="{6CB52EF3-BD4F-4CDA-A68B-0053BCFE8C39}" type="datetimeFigureOut">
               <a:rPr lang="en-IN" smtClean="0"/>
-              <a:t>23-09-2024</a:t>
+              <a:t>06-10-2024</a:t>
             </a:fld>
             <a:endParaRPr lang="en-IN"/>
           </a:p>

</xml_diff>